<commit_message>
more changes following  proof reading
</commit_message>
<xml_diff>
--- a/topic02/talk-1/a-processing-basic-animation.pptx
+++ b/topic02/talk-1/a-processing-basic-animation.pptx
@@ -5,7 +5,7 @@
     <p:sldMasterId id="2147483648" r:id="rId1"/>
   </p:sldMasterIdLst>
   <p:notesMasterIdLst>
-    <p:notesMasterId r:id="rId16"/>
+    <p:notesMasterId r:id="rId15"/>
   </p:notesMasterIdLst>
   <p:sldIdLst>
     <p:sldId id="256" r:id="rId2"/>
@@ -19,9 +19,8 @@
     <p:sldId id="271" r:id="rId10"/>
     <p:sldId id="267" r:id="rId11"/>
     <p:sldId id="268" r:id="rId12"/>
-    <p:sldId id="272" r:id="rId13"/>
-    <p:sldId id="273" r:id="rId14"/>
-    <p:sldId id="274" r:id="rId15"/>
+    <p:sldId id="273" r:id="rId13"/>
+    <p:sldId id="274" r:id="rId14"/>
   </p:sldIdLst>
   <p:sldSz cx="9144000" cy="6858000" type="screen4x3"/>
   <p:notesSz cx="6858000" cy="9144000"/>
@@ -205,7 +204,7 @@
           <a:p>
             <a:fld id="{58C3D141-1E1C-433C-AD3A-CD56CBBB4F9F}" type="datetimeFigureOut">
               <a:rPr lang="en-IE" smtClean="0"/>
-              <a:t>14/01/2016</a:t>
+              <a:t>19/01/2016</a:t>
             </a:fld>
             <a:endParaRPr lang="en-IE"/>
           </a:p>
@@ -1273,187 +1272,6 @@
 </p:notes>
 </file>
 
-<file path=ppt/notesSlides/notesSlide6.xml><?xml version="1.0" encoding="utf-8"?>
-<p:notes xmlns:a="http://schemas.openxmlformats.org/drawingml/2006/main" xmlns:r="http://schemas.openxmlformats.org/officeDocument/2006/relationships" xmlns:p="http://schemas.openxmlformats.org/presentationml/2006/main">
-  <p:cSld>
-    <p:spTree>
-      <p:nvGrpSpPr>
-        <p:cNvPr id="1" name=""/>
-        <p:cNvGrpSpPr/>
-        <p:nvPr/>
-      </p:nvGrpSpPr>
-      <p:grpSpPr>
-        <a:xfrm>
-          <a:off x="0" y="0"/>
-          <a:ext cx="0" cy="0"/>
-          <a:chOff x="0" y="0"/>
-          <a:chExt cx="0" cy="0"/>
-        </a:xfrm>
-      </p:grpSpPr>
-      <p:sp>
-        <p:nvSpPr>
-          <p:cNvPr id="2" name="Slide Image Placeholder 1"/>
-          <p:cNvSpPr>
-            <a:spLocks noGrp="1" noRot="1" noChangeAspect="1"/>
-          </p:cNvSpPr>
-          <p:nvPr>
-            <p:ph type="sldImg"/>
-          </p:nvPr>
-        </p:nvSpPr>
-        <p:spPr/>
-      </p:sp>
-      <p:sp>
-        <p:nvSpPr>
-          <p:cNvPr id="3" name="Notes Placeholder 2"/>
-          <p:cNvSpPr>
-            <a:spLocks noGrp="1"/>
-          </p:cNvSpPr>
-          <p:nvPr>
-            <p:ph type="body" idx="1"/>
-          </p:nvPr>
-        </p:nvSpPr>
-        <p:spPr/>
-        <p:txBody>
-          <a:bodyPr/>
-          <a:lstStyle/>
-          <a:p>
-            <a:r>
-              <a:rPr lang="en-IE" dirty="0" smtClean="0"/>
-              <a:t>void setup()</a:t>
-            </a:r>
-          </a:p>
-          <a:p>
-            <a:r>
-              <a:rPr lang="en-IE" dirty="0" smtClean="0"/>
-              <a:t>{</a:t>
-            </a:r>
-          </a:p>
-          <a:p>
-            <a:r>
-              <a:rPr lang="en-IE" dirty="0" smtClean="0"/>
-              <a:t>  size(500,400); </a:t>
-            </a:r>
-          </a:p>
-          <a:p>
-            <a:r>
-              <a:rPr lang="en-IE" dirty="0" smtClean="0"/>
-              <a:t>}</a:t>
-            </a:r>
-          </a:p>
-          <a:p>
-            <a:endParaRPr lang="en-IE" dirty="0" smtClean="0"/>
-          </a:p>
-          <a:p>
-            <a:r>
-              <a:rPr lang="en-IE" dirty="0" smtClean="0"/>
-              <a:t>void draw()</a:t>
-            </a:r>
-          </a:p>
-          <a:p>
-            <a:r>
-              <a:rPr lang="en-IE" dirty="0" smtClean="0"/>
-              <a:t>{</a:t>
-            </a:r>
-          </a:p>
-          <a:p>
-            <a:r>
-              <a:rPr lang="en-IE" dirty="0" smtClean="0"/>
-              <a:t>  background(0);</a:t>
-            </a:r>
-          </a:p>
-          <a:p>
-            <a:r>
-              <a:rPr lang="en-IE" dirty="0" smtClean="0"/>
-              <a:t>  stroke(0, 0, 0);</a:t>
-            </a:r>
-          </a:p>
-          <a:p>
-            <a:r>
-              <a:rPr lang="en-IE" dirty="0" smtClean="0"/>
-              <a:t>  fill(60, 220, 90);</a:t>
-            </a:r>
-          </a:p>
-          <a:p>
-            <a:r>
-              <a:rPr lang="en-IE" dirty="0" smtClean="0"/>
-              <a:t>  </a:t>
-            </a:r>
-            <a:r>
-              <a:rPr lang="en-IE" dirty="0" err="1" smtClean="0"/>
-              <a:t>rect</a:t>
-            </a:r>
-            <a:r>
-              <a:rPr lang="en-IE" dirty="0" smtClean="0"/>
-              <a:t>(0,100,width, 15);</a:t>
-            </a:r>
-          </a:p>
-          <a:p>
-            <a:r>
-              <a:rPr lang="en-IE" dirty="0" smtClean="0"/>
-              <a:t>  ellipse(</a:t>
-            </a:r>
-            <a:r>
-              <a:rPr lang="en-IE" dirty="0" err="1" smtClean="0"/>
-              <a:t>mouseY</a:t>
-            </a:r>
-            <a:r>
-              <a:rPr lang="en-IE" dirty="0" smtClean="0"/>
-              <a:t>, </a:t>
-            </a:r>
-            <a:r>
-              <a:rPr lang="en-IE" dirty="0" err="1" smtClean="0"/>
-              <a:t>mouseX</a:t>
-            </a:r>
-            <a:r>
-              <a:rPr lang="en-IE" dirty="0" smtClean="0"/>
-              <a:t>, 100, 100);</a:t>
-            </a:r>
-          </a:p>
-          <a:p>
-            <a:r>
-              <a:rPr lang="en-IE" dirty="0" smtClean="0"/>
-              <a:t>}</a:t>
-            </a:r>
-            <a:endParaRPr lang="en-IE" dirty="0"/>
-          </a:p>
-        </p:txBody>
-      </p:sp>
-      <p:sp>
-        <p:nvSpPr>
-          <p:cNvPr id="4" name="Slide Number Placeholder 3"/>
-          <p:cNvSpPr>
-            <a:spLocks noGrp="1"/>
-          </p:cNvSpPr>
-          <p:nvPr>
-            <p:ph type="sldNum" sz="quarter" idx="10"/>
-          </p:nvPr>
-        </p:nvSpPr>
-        <p:spPr/>
-        <p:txBody>
-          <a:bodyPr/>
-          <a:lstStyle/>
-          <a:p>
-            <a:fld id="{F963DB36-5273-45A5-A77C-FE9BE0779D84}" type="slidenum">
-              <a:rPr lang="en-IE" smtClean="0"/>
-              <a:t>12</a:t>
-            </a:fld>
-            <a:endParaRPr lang="en-IE"/>
-          </a:p>
-        </p:txBody>
-      </p:sp>
-    </p:spTree>
-    <p:extLst>
-      <p:ext uri="{BB962C8B-B14F-4D97-AF65-F5344CB8AC3E}">
-        <p14:creationId xmlns:p14="http://schemas.microsoft.com/office/powerpoint/2010/main" val="1517821518"/>
-      </p:ext>
-    </p:extLst>
-  </p:cSld>
-  <p:clrMapOvr>
-    <a:masterClrMapping/>
-  </p:clrMapOvr>
-</p:notes>
-</file>
-
 <file path=ppt/slideLayouts/slideLayout1.xml><?xml version="1.0" encoding="utf-8"?>
 <p:sldLayout xmlns:a="http://schemas.openxmlformats.org/drawingml/2006/main" xmlns:r="http://schemas.openxmlformats.org/officeDocument/2006/relationships" xmlns:p="http://schemas.openxmlformats.org/presentationml/2006/main" type="title" preserve="1">
   <p:cSld name="Title Slide">
@@ -1636,7 +1454,7 @@
             <a:fld id="{1D8BD707-D9CF-40AE-B4C6-C98DA3205C09}" type="datetimeFigureOut">
               <a:rPr lang="en-US" smtClean="0"/>
               <a:pPr/>
-              <a:t>1/14/2016</a:t>
+              <a:t>1/19/2016</a:t>
             </a:fld>
             <a:endParaRPr lang="en-US"/>
           </a:p>
@@ -1810,7 +1628,7 @@
             <a:fld id="{1D8BD707-D9CF-40AE-B4C6-C98DA3205C09}" type="datetimeFigureOut">
               <a:rPr lang="en-US" smtClean="0"/>
               <a:pPr/>
-              <a:t>1/14/2016</a:t>
+              <a:t>1/19/2016</a:t>
             </a:fld>
             <a:endParaRPr lang="en-US"/>
           </a:p>
@@ -1994,7 +1812,7 @@
             <a:fld id="{1D8BD707-D9CF-40AE-B4C6-C98DA3205C09}" type="datetimeFigureOut">
               <a:rPr lang="en-US" smtClean="0"/>
               <a:pPr/>
-              <a:t>1/14/2016</a:t>
+              <a:t>1/19/2016</a:t>
             </a:fld>
             <a:endParaRPr lang="en-US"/>
           </a:p>
@@ -2179,7 +1997,7 @@
             <a:fld id="{1D8BD707-D9CF-40AE-B4C6-C98DA3205C09}" type="datetimeFigureOut">
               <a:rPr lang="en-US" smtClean="0"/>
               <a:pPr/>
-              <a:t>1/14/2016</a:t>
+              <a:t>1/19/2016</a:t>
             </a:fld>
             <a:endParaRPr lang="en-US"/>
           </a:p>
@@ -2467,7 +2285,7 @@
             <a:fld id="{1D8BD707-D9CF-40AE-B4C6-C98DA3205C09}" type="datetimeFigureOut">
               <a:rPr lang="en-US" smtClean="0"/>
               <a:pPr/>
-              <a:t>1/14/2016</a:t>
+              <a:t>1/19/2016</a:t>
             </a:fld>
             <a:endParaRPr lang="en-US"/>
           </a:p>
@@ -2770,7 +2588,7 @@
             <a:fld id="{1D8BD707-D9CF-40AE-B4C6-C98DA3205C09}" type="datetimeFigureOut">
               <a:rPr lang="en-US" smtClean="0"/>
               <a:pPr/>
-              <a:t>1/14/2016</a:t>
+              <a:t>1/19/2016</a:t>
             </a:fld>
             <a:endParaRPr lang="en-US"/>
           </a:p>
@@ -3238,7 +3056,7 @@
             <a:fld id="{1D8BD707-D9CF-40AE-B4C6-C98DA3205C09}" type="datetimeFigureOut">
               <a:rPr lang="en-US" smtClean="0"/>
               <a:pPr/>
-              <a:t>1/14/2016</a:t>
+              <a:t>1/19/2016</a:t>
             </a:fld>
             <a:endParaRPr lang="en-US"/>
           </a:p>
@@ -3406,7 +3224,7 @@
             <a:fld id="{1D8BD707-D9CF-40AE-B4C6-C98DA3205C09}" type="datetimeFigureOut">
               <a:rPr lang="en-US" smtClean="0"/>
               <a:pPr/>
-              <a:t>1/14/2016</a:t>
+              <a:t>1/19/2016</a:t>
             </a:fld>
             <a:endParaRPr lang="en-US"/>
           </a:p>
@@ -3540,7 +3358,7 @@
             <a:fld id="{1D8BD707-D9CF-40AE-B4C6-C98DA3205C09}" type="datetimeFigureOut">
               <a:rPr lang="en-US" smtClean="0"/>
               <a:pPr/>
-              <a:t>1/14/2016</a:t>
+              <a:t>1/19/2016</a:t>
             </a:fld>
             <a:endParaRPr lang="en-US"/>
           </a:p>
@@ -3821,7 +3639,7 @@
             <a:fld id="{1D8BD707-D9CF-40AE-B4C6-C98DA3205C09}" type="datetimeFigureOut">
               <a:rPr lang="en-US" smtClean="0"/>
               <a:pPr/>
-              <a:t>1/14/2016</a:t>
+              <a:t>1/19/2016</a:t>
             </a:fld>
             <a:endParaRPr lang="en-US"/>
           </a:p>
@@ -4078,7 +3896,7 @@
             <a:fld id="{1D8BD707-D9CF-40AE-B4C6-C98DA3205C09}" type="datetimeFigureOut">
               <a:rPr lang="en-US" smtClean="0"/>
               <a:pPr/>
-              <a:t>1/14/2016</a:t>
+              <a:t>1/19/2016</a:t>
             </a:fld>
             <a:endParaRPr lang="en-US"/>
           </a:p>
@@ -4295,7 +4113,7 @@
             <a:fld id="{1D8BD707-D9CF-40AE-B4C6-C98DA3205C09}" type="datetimeFigureOut">
               <a:rPr lang="en-US" smtClean="0"/>
               <a:pPr/>
-              <a:t>1/14/2016</a:t>
+              <a:t>1/19/2016</a:t>
             </a:fld>
             <a:endParaRPr lang="en-US"/>
           </a:p>
@@ -5442,270 +5260,6 @@
           <a:chExt cx="0" cy="0"/>
         </a:xfrm>
       </p:grpSpPr>
-      <p:pic>
-        <p:nvPicPr>
-          <p:cNvPr id="4099" name="Picture 3"/>
-          <p:cNvPicPr>
-            <a:picLocks noChangeAspect="1" noChangeArrowheads="1"/>
-          </p:cNvPicPr>
-          <p:nvPr/>
-        </p:nvPicPr>
-        <p:blipFill rotWithShape="1">
-          <a:blip r:embed="rId3">
-            <a:extLst>
-              <a:ext uri="{28A0092B-C50C-407E-A947-70E740481C1C}">
-                <a14:useLocalDpi xmlns:a14="http://schemas.microsoft.com/office/drawing/2010/main" val="0"/>
-              </a:ext>
-            </a:extLst>
-          </a:blip>
-          <a:srcRect l="59124" t="19573" r="4997" b="35471"/>
-          <a:stretch/>
-        </p:blipFill>
-        <p:spPr bwMode="auto">
-          <a:xfrm>
-            <a:off x="412223" y="1905000"/>
-            <a:ext cx="6598177" cy="4648200"/>
-          </a:xfrm>
-          <a:prstGeom prst="rect">
-            <a:avLst/>
-          </a:prstGeom>
-          <a:noFill/>
-          <a:ln w="9525">
-            <a:solidFill>
-              <a:schemeClr val="tx1"/>
-            </a:solidFill>
-            <a:miter lim="800000"/>
-            <a:headEnd/>
-            <a:tailEnd/>
-          </a:ln>
-          <a:extLst>
-            <a:ext uri="{909E8E84-426E-40DD-AFC4-6F175D3DCCD1}">
-              <a14:hiddenFill xmlns:a14="http://schemas.microsoft.com/office/drawing/2010/main">
-                <a:solidFill>
-                  <a:schemeClr val="accent1"/>
-                </a:solidFill>
-              </a14:hiddenFill>
-            </a:ext>
-          </a:extLst>
-        </p:spPr>
-      </p:pic>
-      <p:sp>
-        <p:nvSpPr>
-          <p:cNvPr id="2" name="Title 1"/>
-          <p:cNvSpPr>
-            <a:spLocks noGrp="1"/>
-          </p:cNvSpPr>
-          <p:nvPr>
-            <p:ph type="title"/>
-          </p:nvPr>
-        </p:nvSpPr>
-        <p:spPr/>
-        <p:txBody>
-          <a:bodyPr/>
-          <a:lstStyle/>
-          <a:p>
-            <a:r>
-              <a:rPr lang="en-IE" dirty="0"/>
-              <a:t>System Variables in Processing</a:t>
-            </a:r>
-          </a:p>
-        </p:txBody>
-      </p:sp>
-      <p:pic>
-        <p:nvPicPr>
-          <p:cNvPr id="4098" name="Picture 2"/>
-          <p:cNvPicPr>
-            <a:picLocks noChangeAspect="1" noChangeArrowheads="1"/>
-          </p:cNvPicPr>
-          <p:nvPr/>
-        </p:nvPicPr>
-        <p:blipFill rotWithShape="1">
-          <a:blip r:embed="rId3">
-            <a:extLst>
-              <a:ext uri="{28A0092B-C50C-407E-A947-70E740481C1C}">
-                <a14:useLocalDpi xmlns:a14="http://schemas.microsoft.com/office/drawing/2010/main" val="0"/>
-              </a:ext>
-            </a:extLst>
-          </a:blip>
-          <a:srcRect l="19604" t="18860" r="42421" b="24780"/>
-          <a:stretch/>
-        </p:blipFill>
-        <p:spPr bwMode="auto">
-          <a:xfrm>
-            <a:off x="5638800" y="1524000"/>
-            <a:ext cx="3104927" cy="2590800"/>
-          </a:xfrm>
-          <a:prstGeom prst="rect">
-            <a:avLst/>
-          </a:prstGeom>
-          <a:noFill/>
-          <a:ln>
-            <a:noFill/>
-          </a:ln>
-          <a:extLst>
-            <a:ext uri="{909E8E84-426E-40DD-AFC4-6F175D3DCCD1}">
-              <a14:hiddenFill xmlns:a14="http://schemas.microsoft.com/office/drawing/2010/main">
-                <a:solidFill>
-                  <a:schemeClr val="accent1"/>
-                </a:solidFill>
-              </a14:hiddenFill>
-            </a:ext>
-            <a:ext uri="{91240B29-F687-4F45-9708-019B960494DF}">
-              <a14:hiddenLine xmlns:a14="http://schemas.microsoft.com/office/drawing/2010/main" w="9525">
-                <a:solidFill>
-                  <a:schemeClr val="tx1"/>
-                </a:solidFill>
-                <a:miter lim="800000"/>
-                <a:headEnd/>
-                <a:tailEnd/>
-              </a14:hiddenLine>
-            </a:ext>
-          </a:extLst>
-        </p:spPr>
-      </p:pic>
-      <p:sp>
-        <p:nvSpPr>
-          <p:cNvPr id="3" name="TextBox 2"/>
-          <p:cNvSpPr txBox="1"/>
-          <p:nvPr/>
-        </p:nvSpPr>
-        <p:spPr>
-          <a:xfrm>
-            <a:off x="4347411" y="4306431"/>
-            <a:ext cx="4400327" cy="2246769"/>
-          </a:xfrm>
-          <a:prstGeom prst="rect">
-            <a:avLst/>
-          </a:prstGeom>
-          <a:solidFill>
-            <a:schemeClr val="accent6">
-              <a:lumMod val="20000"/>
-              <a:lumOff val="80000"/>
-            </a:schemeClr>
-          </a:solidFill>
-          <a:ln>
-            <a:solidFill>
-              <a:schemeClr val="accent1"/>
-            </a:solidFill>
-          </a:ln>
-        </p:spPr>
-        <p:txBody>
-          <a:bodyPr wrap="square" rtlCol="0">
-            <a:spAutoFit/>
-          </a:bodyPr>
-          <a:lstStyle/>
-          <a:p>
-            <a:r>
-              <a:rPr lang="en-IE" sz="2800" dirty="0" smtClean="0"/>
-              <a:t>Q: </a:t>
-            </a:r>
-            <a:r>
-              <a:rPr lang="en-IE" sz="2800" dirty="0"/>
-              <a:t>What would happen to our animation if we swapped the </a:t>
-            </a:r>
-            <a:r>
-              <a:rPr lang="en-IE" sz="2800" b="1" dirty="0" err="1" smtClean="0">
-                <a:solidFill>
-                  <a:srgbClr val="FF0000"/>
-                </a:solidFill>
-              </a:rPr>
-              <a:t>mouseX</a:t>
-            </a:r>
-            <a:r>
-              <a:rPr lang="en-IE" sz="2800" dirty="0" smtClean="0"/>
-              <a:t> </a:t>
-            </a:r>
-            <a:r>
-              <a:rPr lang="en-IE" sz="2800" dirty="0"/>
-              <a:t>and </a:t>
-            </a:r>
-            <a:r>
-              <a:rPr lang="en-IE" sz="2800" b="1" dirty="0" err="1" smtClean="0">
-                <a:solidFill>
-                  <a:srgbClr val="FF0000"/>
-                </a:solidFill>
-              </a:rPr>
-              <a:t>mouseY</a:t>
-            </a:r>
-            <a:r>
-              <a:rPr lang="en-IE" sz="2800" dirty="0" smtClean="0"/>
-              <a:t> </a:t>
-            </a:r>
-            <a:r>
-              <a:rPr lang="en-IE" sz="2800" dirty="0"/>
-              <a:t>global variables in the </a:t>
-            </a:r>
-            <a:r>
-              <a:rPr lang="en-IE" sz="2800" b="1" dirty="0" smtClean="0">
-                <a:solidFill>
-                  <a:schemeClr val="tx2">
-                    <a:lumMod val="60000"/>
-                    <a:lumOff val="40000"/>
-                  </a:schemeClr>
-                </a:solidFill>
-              </a:rPr>
-              <a:t>ellipse</a:t>
-            </a:r>
-            <a:r>
-              <a:rPr lang="en-IE" sz="2800" dirty="0" smtClean="0">
-                <a:solidFill>
-                  <a:schemeClr val="tx2">
-                    <a:lumMod val="60000"/>
-                    <a:lumOff val="40000"/>
-                  </a:schemeClr>
-                </a:solidFill>
-              </a:rPr>
-              <a:t> </a:t>
-            </a:r>
-            <a:r>
-              <a:rPr lang="en-IE" sz="2800" dirty="0"/>
-              <a:t>function with each other</a:t>
-            </a:r>
-            <a:r>
-              <a:rPr lang="en-IE" sz="2800" dirty="0" smtClean="0"/>
-              <a:t>?</a:t>
-            </a:r>
-            <a:endParaRPr lang="en-IE" sz="2800" dirty="0"/>
-          </a:p>
-        </p:txBody>
-      </p:sp>
-    </p:spTree>
-    <p:extLst>
-      <p:ext uri="{BB962C8B-B14F-4D97-AF65-F5344CB8AC3E}">
-        <p14:creationId xmlns:p14="http://schemas.microsoft.com/office/powerpoint/2010/main" val="362568781"/>
-      </p:ext>
-    </p:extLst>
-  </p:cSld>
-  <p:clrMapOvr>
-    <a:masterClrMapping/>
-  </p:clrMapOvr>
-  <p:timing>
-    <p:tnLst>
-      <p:par>
-        <p:cTn id="1" dur="indefinite" restart="never" nodeType="tmRoot"/>
-      </p:par>
-    </p:tnLst>
-  </p:timing>
-</p:sld>
-</file>
-
-<file path=ppt/slides/slide13.xml><?xml version="1.0" encoding="utf-8"?>
-<p:sld xmlns:a="http://schemas.openxmlformats.org/drawingml/2006/main" xmlns:r="http://schemas.openxmlformats.org/officeDocument/2006/relationships" xmlns:p="http://schemas.openxmlformats.org/presentationml/2006/main">
-  <p:cSld>
-    <p:spTree>
-      <p:nvGrpSpPr>
-        <p:cNvPr id="1" name=""/>
-        <p:cNvGrpSpPr/>
-        <p:nvPr/>
-      </p:nvGrpSpPr>
-      <p:grpSpPr>
-        <a:xfrm>
-          <a:off x="0" y="0"/>
-          <a:ext cx="0" cy="0"/>
-          <a:chOff x="0" y="0"/>
-          <a:chExt cx="0" cy="0"/>
-        </a:xfrm>
-      </p:grpSpPr>
       <p:sp>
         <p:nvSpPr>
           <p:cNvPr id="2" name="Title 1"/>
@@ -5783,7 +5337,7 @@
 </p:sld>
 </file>
 
-<file path=ppt/slides/slide14.xml><?xml version="1.0" encoding="utf-8"?>
+<file path=ppt/slides/slide13.xml><?xml version="1.0" encoding="utf-8"?>
 <p:sld xmlns:a="http://schemas.openxmlformats.org/drawingml/2006/main" xmlns:r="http://schemas.openxmlformats.org/officeDocument/2006/relationships" xmlns:p="http://schemas.openxmlformats.org/presentationml/2006/main">
   <p:cSld>
     <p:spTree>

</xml_diff>